<commit_message>
Old changes to a presentation file.
</commit_message>
<xml_diff>
--- a/Text/Presentation_2205.pptx
+++ b/Text/Presentation_2205.pptx
@@ -393,7 +393,7 @@
           <a:p>
             <a:fld id="{7EDDFEA7-AA1F-4AF8-A6AD-8CBE05A6A8E1}" type="datetimeFigureOut">
               <a:rPr lang="en-US" smtClean="0"/>
-              <a:t>5/22/2024</a:t>
+              <a:t>5/23/2024</a:t>
             </a:fld>
             <a:endParaRPr lang="en-US"/>
           </a:p>
@@ -807,7 +807,7 @@
           <a:p>
             <a:fld id="{7EDDFEA7-AA1F-4AF8-A6AD-8CBE05A6A8E1}" type="datetimeFigureOut">
               <a:rPr lang="en-US" smtClean="0"/>
-              <a:t>5/22/2024</a:t>
+              <a:t>5/23/2024</a:t>
             </a:fld>
             <a:endParaRPr lang="en-US"/>
           </a:p>
@@ -1143,7 +1143,7 @@
           <a:p>
             <a:fld id="{7EDDFEA7-AA1F-4AF8-A6AD-8CBE05A6A8E1}" type="datetimeFigureOut">
               <a:rPr lang="en-US" smtClean="0"/>
-              <a:t>5/22/2024</a:t>
+              <a:t>5/23/2024</a:t>
             </a:fld>
             <a:endParaRPr lang="en-US"/>
           </a:p>
@@ -1548,7 +1548,7 @@
           <a:p>
             <a:fld id="{7EDDFEA7-AA1F-4AF8-A6AD-8CBE05A6A8E1}" type="datetimeFigureOut">
               <a:rPr lang="en-US" smtClean="0"/>
-              <a:t>5/22/2024</a:t>
+              <a:t>5/23/2024</a:t>
             </a:fld>
             <a:endParaRPr lang="en-US"/>
           </a:p>
@@ -2116,7 +2116,7 @@
           <a:p>
             <a:fld id="{7EDDFEA7-AA1F-4AF8-A6AD-8CBE05A6A8E1}" type="datetimeFigureOut">
               <a:rPr lang="en-US" smtClean="0"/>
-              <a:t>5/22/2024</a:t>
+              <a:t>5/23/2024</a:t>
             </a:fld>
             <a:endParaRPr lang="en-US"/>
           </a:p>
@@ -2797,7 +2797,7 @@
           <a:p>
             <a:fld id="{7EDDFEA7-AA1F-4AF8-A6AD-8CBE05A6A8E1}" type="datetimeFigureOut">
               <a:rPr lang="en-US" smtClean="0"/>
-              <a:t>5/22/2024</a:t>
+              <a:t>5/23/2024</a:t>
             </a:fld>
             <a:endParaRPr lang="en-US"/>
           </a:p>
@@ -3710,7 +3710,7 @@
           <a:p>
             <a:fld id="{7EDDFEA7-AA1F-4AF8-A6AD-8CBE05A6A8E1}" type="datetimeFigureOut">
               <a:rPr lang="en-US" smtClean="0"/>
-              <a:t>5/22/2024</a:t>
+              <a:t>5/23/2024</a:t>
             </a:fld>
             <a:endParaRPr lang="en-US"/>
           </a:p>
@@ -4023,7 +4023,7 @@
           <a:p>
             <a:fld id="{7EDDFEA7-AA1F-4AF8-A6AD-8CBE05A6A8E1}" type="datetimeFigureOut">
               <a:rPr lang="en-US" smtClean="0"/>
-              <a:t>5/22/2024</a:t>
+              <a:t>5/23/2024</a:t>
             </a:fld>
             <a:endParaRPr lang="en-US"/>
           </a:p>
@@ -4287,7 +4287,7 @@
           <a:p>
             <a:fld id="{7EDDFEA7-AA1F-4AF8-A6AD-8CBE05A6A8E1}" type="datetimeFigureOut">
               <a:rPr lang="en-US" smtClean="0"/>
-              <a:t>5/22/2024</a:t>
+              <a:t>5/23/2024</a:t>
             </a:fld>
             <a:endParaRPr lang="en-US"/>
           </a:p>
@@ -4610,7 +4610,7 @@
           <a:p>
             <a:fld id="{7EDDFEA7-AA1F-4AF8-A6AD-8CBE05A6A8E1}" type="datetimeFigureOut">
               <a:rPr lang="en-US" smtClean="0"/>
-              <a:t>5/22/2024</a:t>
+              <a:t>5/23/2024</a:t>
             </a:fld>
             <a:endParaRPr lang="en-US"/>
           </a:p>
@@ -4999,7 +4999,7 @@
           <a:p>
             <a:fld id="{7EDDFEA7-AA1F-4AF8-A6AD-8CBE05A6A8E1}" type="datetimeFigureOut">
               <a:rPr lang="en-US" smtClean="0"/>
-              <a:t>5/22/2024</a:t>
+              <a:t>5/23/2024</a:t>
             </a:fld>
             <a:endParaRPr lang="en-US"/>
           </a:p>
@@ -5375,7 +5375,7 @@
           <a:p>
             <a:fld id="{7EDDFEA7-AA1F-4AF8-A6AD-8CBE05A6A8E1}" type="datetimeFigureOut">
               <a:rPr lang="en-US" smtClean="0"/>
-              <a:t>5/22/2024</a:t>
+              <a:t>5/23/2024</a:t>
             </a:fld>
             <a:endParaRPr lang="en-US"/>
           </a:p>
@@ -5881,7 +5881,7 @@
           <a:p>
             <a:fld id="{7EDDFEA7-AA1F-4AF8-A6AD-8CBE05A6A8E1}" type="datetimeFigureOut">
               <a:rPr lang="en-US" smtClean="0"/>
-              <a:t>5/22/2024</a:t>
+              <a:t>5/23/2024</a:t>
             </a:fld>
             <a:endParaRPr lang="en-US"/>
           </a:p>
@@ -6138,7 +6138,7 @@
           <a:p>
             <a:fld id="{7EDDFEA7-AA1F-4AF8-A6AD-8CBE05A6A8E1}" type="datetimeFigureOut">
               <a:rPr lang="en-US" smtClean="0"/>
-              <a:t>5/22/2024</a:t>
+              <a:t>5/23/2024</a:t>
             </a:fld>
             <a:endParaRPr lang="en-US"/>
           </a:p>
@@ -6301,7 +6301,7 @@
           <a:p>
             <a:fld id="{7EDDFEA7-AA1F-4AF8-A6AD-8CBE05A6A8E1}" type="datetimeFigureOut">
               <a:rPr lang="en-US" smtClean="0"/>
-              <a:t>5/22/2024</a:t>
+              <a:t>5/23/2024</a:t>
             </a:fld>
             <a:endParaRPr lang="en-US"/>
           </a:p>
@@ -6691,7 +6691,7 @@
           <a:p>
             <a:fld id="{7EDDFEA7-AA1F-4AF8-A6AD-8CBE05A6A8E1}" type="datetimeFigureOut">
               <a:rPr lang="en-US" smtClean="0"/>
-              <a:t>5/22/2024</a:t>
+              <a:t>5/23/2024</a:t>
             </a:fld>
             <a:endParaRPr lang="en-US"/>
           </a:p>
@@ -7100,7 +7100,7 @@
           <a:p>
             <a:fld id="{7EDDFEA7-AA1F-4AF8-A6AD-8CBE05A6A8E1}" type="datetimeFigureOut">
               <a:rPr lang="en-US" smtClean="0"/>
-              <a:t>5/22/2024</a:t>
+              <a:t>5/23/2024</a:t>
             </a:fld>
             <a:endParaRPr lang="en-US"/>
           </a:p>
@@ -7344,7 +7344,7 @@
           <a:p>
             <a:fld id="{7EDDFEA7-AA1F-4AF8-A6AD-8CBE05A6A8E1}" type="datetimeFigureOut">
               <a:rPr lang="en-US" smtClean="0"/>
-              <a:t>5/22/2024</a:t>
+              <a:t>5/23/2024</a:t>
             </a:fld>
             <a:endParaRPr lang="en-US"/>
           </a:p>
@@ -7919,7 +7919,7 @@
           <a:p>
             <a:r>
               <a:rPr lang="en-US" dirty="0"/>
-              <a:t>Game Logic often depends on relative („semantic“) positions rather than absolute, continuous coordinate representations</a:t>
+              <a:t>Mental Models of Game Logic often depends on relative („semantic“) positions rather than absolute, continuous coordinate representations</a:t>
             </a:r>
           </a:p>
           <a:p>
@@ -8128,10 +8128,9 @@
           <a:lstStyle/>
           <a:p>
             <a:r>
-              <a:rPr lang="de-DE" dirty="0"/>
-              <a:t>(Research) Questions</a:t>
-            </a:r>
-            <a:endParaRPr lang="en-US" dirty="0"/>
+              <a:rPr lang="en-GB" dirty="0"/>
+              <a:t>Requirements / Evaluation</a:t>
+            </a:r>
           </a:p>
         </p:txBody>
       </p:sp>
@@ -8272,6 +8271,9 @@
             </a:r>
           </a:p>
           <a:p>
+            <a:pPr marL="0" indent="0">
+              <a:buNone/>
+            </a:pPr>
             <a:endParaRPr lang="de-DE" dirty="0"/>
           </a:p>
         </p:txBody>

</xml_diff>